<commit_message>
Change fetch_user_input module content #360
</commit_message>
<xml_diff>
--- a/figures/resources/fetching_user_input.pptx
+++ b/figures/resources/fetching_user_input.pptx
@@ -8,6 +8,7 @@
     <p:sldId id="256" r:id="rId2"/>
     <p:sldId id="257" r:id="rId3"/>
     <p:sldId id="258" r:id="rId4"/>
+    <p:sldId id="259" r:id="rId5"/>
   </p:sldIdLst>
   <p:sldSz cx="12192000" cy="6858000"/>
   <p:notesSz cx="6858000" cy="9144000"/>
@@ -487,7 +488,7 @@
           <a:p>
             <a:fld id="{783D4129-6E14-4DEB-A88B-FA76BDE6DE9E}" type="datetimeFigureOut">
               <a:rPr lang="en-DE" smtClean="0"/>
-              <a:t>17/03/2022</a:t>
+              <a:t>3/18/22</a:t>
             </a:fld>
             <a:endParaRPr lang="en-DE"/>
           </a:p>
@@ -687,7 +688,7 @@
           <a:p>
             <a:fld id="{783D4129-6E14-4DEB-A88B-FA76BDE6DE9E}" type="datetimeFigureOut">
               <a:rPr lang="en-DE" smtClean="0"/>
-              <a:t>17/03/2022</a:t>
+              <a:t>3/18/22</a:t>
             </a:fld>
             <a:endParaRPr lang="en-DE"/>
           </a:p>
@@ -897,7 +898,7 @@
           <a:p>
             <a:fld id="{783D4129-6E14-4DEB-A88B-FA76BDE6DE9E}" type="datetimeFigureOut">
               <a:rPr lang="en-DE" smtClean="0"/>
-              <a:t>17/03/2022</a:t>
+              <a:t>3/18/22</a:t>
             </a:fld>
             <a:endParaRPr lang="en-DE"/>
           </a:p>
@@ -1097,7 +1098,7 @@
           <a:p>
             <a:fld id="{783D4129-6E14-4DEB-A88B-FA76BDE6DE9E}" type="datetimeFigureOut">
               <a:rPr lang="en-DE" smtClean="0"/>
-              <a:t>17/03/2022</a:t>
+              <a:t>3/18/22</a:t>
             </a:fld>
             <a:endParaRPr lang="en-DE"/>
           </a:p>
@@ -1373,7 +1374,7 @@
           <a:p>
             <a:fld id="{783D4129-6E14-4DEB-A88B-FA76BDE6DE9E}" type="datetimeFigureOut">
               <a:rPr lang="en-DE" smtClean="0"/>
-              <a:t>17/03/2022</a:t>
+              <a:t>3/18/22</a:t>
             </a:fld>
             <a:endParaRPr lang="en-DE"/>
           </a:p>
@@ -1641,7 +1642,7 @@
           <a:p>
             <a:fld id="{783D4129-6E14-4DEB-A88B-FA76BDE6DE9E}" type="datetimeFigureOut">
               <a:rPr lang="en-DE" smtClean="0"/>
-              <a:t>17/03/2022</a:t>
+              <a:t>3/18/22</a:t>
             </a:fld>
             <a:endParaRPr lang="en-DE"/>
           </a:p>
@@ -2056,7 +2057,7 @@
           <a:p>
             <a:fld id="{783D4129-6E14-4DEB-A88B-FA76BDE6DE9E}" type="datetimeFigureOut">
               <a:rPr lang="en-DE" smtClean="0"/>
-              <a:t>17/03/2022</a:t>
+              <a:t>3/18/22</a:t>
             </a:fld>
             <a:endParaRPr lang="en-DE"/>
           </a:p>
@@ -2198,7 +2199,7 @@
           <a:p>
             <a:fld id="{783D4129-6E14-4DEB-A88B-FA76BDE6DE9E}" type="datetimeFigureOut">
               <a:rPr lang="en-DE" smtClean="0"/>
-              <a:t>17/03/2022</a:t>
+              <a:t>3/18/22</a:t>
             </a:fld>
             <a:endParaRPr lang="en-DE"/>
           </a:p>
@@ -2311,7 +2312,7 @@
           <a:p>
             <a:fld id="{783D4129-6E14-4DEB-A88B-FA76BDE6DE9E}" type="datetimeFigureOut">
               <a:rPr lang="en-DE" smtClean="0"/>
-              <a:t>17/03/2022</a:t>
+              <a:t>3/18/22</a:t>
             </a:fld>
             <a:endParaRPr lang="en-DE"/>
           </a:p>
@@ -2624,7 +2625,7 @@
           <a:p>
             <a:fld id="{783D4129-6E14-4DEB-A88B-FA76BDE6DE9E}" type="datetimeFigureOut">
               <a:rPr lang="en-DE" smtClean="0"/>
-              <a:t>17/03/2022</a:t>
+              <a:t>3/18/22</a:t>
             </a:fld>
             <a:endParaRPr lang="en-DE"/>
           </a:p>
@@ -2913,7 +2914,7 @@
           <a:p>
             <a:fld id="{783D4129-6E14-4DEB-A88B-FA76BDE6DE9E}" type="datetimeFigureOut">
               <a:rPr lang="en-DE" smtClean="0"/>
-              <a:t>17/03/2022</a:t>
+              <a:t>3/18/22</a:t>
             </a:fld>
             <a:endParaRPr lang="en-DE"/>
           </a:p>
@@ -3156,7 +3157,7 @@
           <a:p>
             <a:fld id="{783D4129-6E14-4DEB-A88B-FA76BDE6DE9E}" type="datetimeFigureOut">
               <a:rPr lang="en-DE" smtClean="0"/>
-              <a:t>17/03/2022</a:t>
+              <a:t>3/18/22</a:t>
             </a:fld>
             <a:endParaRPr lang="en-DE"/>
           </a:p>
@@ -5510,8 +5511,8 @@
             </a:p>
           </p:txBody>
         </p:sp>
-        <mc:AlternateContent xmlns:mc="http://schemas.openxmlformats.org/markup-compatibility/2006">
-          <mc:Choice xmlns:p14="http://schemas.microsoft.com/office/powerpoint/2010/main" xmlns:aink="http://schemas.microsoft.com/office/drawing/2016/ink" Requires="p14 aink">
+        <mc:AlternateContent xmlns:mc="http://schemas.openxmlformats.org/markup-compatibility/2006" xmlns:p14="http://schemas.microsoft.com/office/powerpoint/2010/main" xmlns:aink="http://schemas.microsoft.com/office/drawing/2016/ink">
+          <mc:Choice Requires="p14 aink">
             <p:contentPart p14:bwMode="auto" r:id="rId3">
               <p14:nvContentPartPr>
                 <p14:cNvPr id="34" name="Ink 33">
@@ -5530,7 +5531,7 @@
               </p14:xfrm>
             </p:contentPart>
           </mc:Choice>
-          <mc:Fallback>
+          <mc:Fallback xmlns="">
             <p:pic>
               <p:nvPicPr>
                 <p:cNvPr id="34" name="Ink 33">
@@ -5561,8 +5562,8 @@
             </p:pic>
           </mc:Fallback>
         </mc:AlternateContent>
-        <mc:AlternateContent xmlns:mc="http://schemas.openxmlformats.org/markup-compatibility/2006">
-          <mc:Choice xmlns:p14="http://schemas.microsoft.com/office/powerpoint/2010/main" xmlns:aink="http://schemas.microsoft.com/office/drawing/2016/ink" Requires="p14 aink">
+        <mc:AlternateContent xmlns:mc="http://schemas.openxmlformats.org/markup-compatibility/2006" xmlns:p14="http://schemas.microsoft.com/office/powerpoint/2010/main" xmlns:aink="http://schemas.microsoft.com/office/drawing/2016/ink">
+          <mc:Choice Requires="p14 aink">
             <p:contentPart p14:bwMode="auto" r:id="rId5">
               <p14:nvContentPartPr>
                 <p14:cNvPr id="36" name="Ink 35">
@@ -5581,7 +5582,7 @@
               </p14:xfrm>
             </p:contentPart>
           </mc:Choice>
-          <mc:Fallback>
+          <mc:Fallback xmlns="">
             <p:pic>
               <p:nvPicPr>
                 <p:cNvPr id="36" name="Ink 35">
@@ -5612,8 +5613,8 @@
             </p:pic>
           </mc:Fallback>
         </mc:AlternateContent>
-        <mc:AlternateContent xmlns:mc="http://schemas.openxmlformats.org/markup-compatibility/2006">
-          <mc:Choice xmlns:p14="http://schemas.microsoft.com/office/powerpoint/2010/main" xmlns:aink="http://schemas.microsoft.com/office/drawing/2016/ink" Requires="p14 aink">
+        <mc:AlternateContent xmlns:mc="http://schemas.openxmlformats.org/markup-compatibility/2006" xmlns:p14="http://schemas.microsoft.com/office/powerpoint/2010/main" xmlns:aink="http://schemas.microsoft.com/office/drawing/2016/ink">
+          <mc:Choice Requires="p14 aink">
             <p:contentPart p14:bwMode="auto" r:id="rId7">
               <p14:nvContentPartPr>
                 <p14:cNvPr id="38" name="Ink 37">
@@ -5632,7 +5633,7 @@
               </p14:xfrm>
             </p:contentPart>
           </mc:Choice>
-          <mc:Fallback>
+          <mc:Fallback xmlns="">
             <p:pic>
               <p:nvPicPr>
                 <p:cNvPr id="38" name="Ink 37">
@@ -5663,8 +5664,8 @@
             </p:pic>
           </mc:Fallback>
         </mc:AlternateContent>
-        <mc:AlternateContent xmlns:mc="http://schemas.openxmlformats.org/markup-compatibility/2006">
-          <mc:Choice xmlns:p14="http://schemas.microsoft.com/office/powerpoint/2010/main" xmlns:aink="http://schemas.microsoft.com/office/drawing/2016/ink" Requires="p14 aink">
+        <mc:AlternateContent xmlns:mc="http://schemas.openxmlformats.org/markup-compatibility/2006" xmlns:p14="http://schemas.microsoft.com/office/powerpoint/2010/main" xmlns:aink="http://schemas.microsoft.com/office/drawing/2016/ink">
+          <mc:Choice Requires="p14 aink">
             <p:contentPart p14:bwMode="auto" r:id="rId9">
               <p14:nvContentPartPr>
                 <p14:cNvPr id="39" name="Ink 38">
@@ -5683,7 +5684,7 @@
               </p14:xfrm>
             </p:contentPart>
           </mc:Choice>
-          <mc:Fallback>
+          <mc:Fallback xmlns="">
             <p:pic>
               <p:nvPicPr>
                 <p:cNvPr id="39" name="Ink 38">
@@ -5714,8 +5715,8 @@
             </p:pic>
           </mc:Fallback>
         </mc:AlternateContent>
-        <mc:AlternateContent xmlns:mc="http://schemas.openxmlformats.org/markup-compatibility/2006">
-          <mc:Choice xmlns:p14="http://schemas.microsoft.com/office/powerpoint/2010/main" xmlns:aink="http://schemas.microsoft.com/office/drawing/2016/ink" Requires="p14 aink">
+        <mc:AlternateContent xmlns:mc="http://schemas.openxmlformats.org/markup-compatibility/2006" xmlns:p14="http://schemas.microsoft.com/office/powerpoint/2010/main" xmlns:aink="http://schemas.microsoft.com/office/drawing/2016/ink">
+          <mc:Choice Requires="p14 aink">
             <p:contentPart p14:bwMode="auto" r:id="rId11">
               <p14:nvContentPartPr>
                 <p14:cNvPr id="40" name="Ink 39">
@@ -5734,7 +5735,7 @@
               </p14:xfrm>
             </p:contentPart>
           </mc:Choice>
-          <mc:Fallback>
+          <mc:Fallback xmlns="">
             <p:pic>
               <p:nvPicPr>
                 <p:cNvPr id="40" name="Ink 39">
@@ -5765,8 +5766,8 @@
             </p:pic>
           </mc:Fallback>
         </mc:AlternateContent>
-        <mc:AlternateContent xmlns:mc="http://schemas.openxmlformats.org/markup-compatibility/2006">
-          <mc:Choice xmlns:p14="http://schemas.microsoft.com/office/powerpoint/2010/main" xmlns:aink="http://schemas.microsoft.com/office/drawing/2016/ink" Requires="p14 aink">
+        <mc:AlternateContent xmlns:mc="http://schemas.openxmlformats.org/markup-compatibility/2006" xmlns:p14="http://schemas.microsoft.com/office/powerpoint/2010/main" xmlns:aink="http://schemas.microsoft.com/office/drawing/2016/ink">
+          <mc:Choice Requires="p14 aink">
             <p:contentPart p14:bwMode="auto" r:id="rId13">
               <p14:nvContentPartPr>
                 <p14:cNvPr id="41" name="Ink 40">
@@ -5785,7 +5786,7 @@
               </p14:xfrm>
             </p:contentPart>
           </mc:Choice>
-          <mc:Fallback>
+          <mc:Fallback xmlns="">
             <p:pic>
               <p:nvPicPr>
                 <p:cNvPr id="41" name="Ink 40">
@@ -5836,8 +5837,8 @@
               <a:chExt cx="360" cy="360"/>
             </a:xfrm>
           </p:grpSpPr>
-          <mc:AlternateContent xmlns:mc="http://schemas.openxmlformats.org/markup-compatibility/2006">
-            <mc:Choice xmlns:p14="http://schemas.microsoft.com/office/powerpoint/2010/main" xmlns:aink="http://schemas.microsoft.com/office/drawing/2016/ink" Requires="p14 aink">
+          <mc:AlternateContent xmlns:mc="http://schemas.openxmlformats.org/markup-compatibility/2006" xmlns:p14="http://schemas.microsoft.com/office/powerpoint/2010/main" xmlns:aink="http://schemas.microsoft.com/office/drawing/2016/ink">
+            <mc:Choice Requires="p14 aink">
               <p:contentPart p14:bwMode="auto" r:id="rId15">
                 <p14:nvContentPartPr>
                   <p14:cNvPr id="42" name="Ink 41">
@@ -5856,7 +5857,7 @@
                 </p14:xfrm>
               </p:contentPart>
             </mc:Choice>
-            <mc:Fallback>
+            <mc:Fallback xmlns="">
               <p:pic>
                 <p:nvPicPr>
                   <p:cNvPr id="42" name="Ink 41">
@@ -5887,8 +5888,8 @@
               </p:pic>
             </mc:Fallback>
           </mc:AlternateContent>
-          <mc:AlternateContent xmlns:mc="http://schemas.openxmlformats.org/markup-compatibility/2006">
-            <mc:Choice xmlns:p14="http://schemas.microsoft.com/office/powerpoint/2010/main" xmlns:aink="http://schemas.microsoft.com/office/drawing/2016/ink" Requires="p14 aink">
+          <mc:AlternateContent xmlns:mc="http://schemas.openxmlformats.org/markup-compatibility/2006" xmlns:p14="http://schemas.microsoft.com/office/powerpoint/2010/main" xmlns:aink="http://schemas.microsoft.com/office/drawing/2016/ink">
+            <mc:Choice Requires="p14 aink">
               <p:contentPart p14:bwMode="auto" r:id="rId17">
                 <p14:nvContentPartPr>
                   <p14:cNvPr id="43" name="Ink 42">
@@ -5907,7 +5908,7 @@
                 </p14:xfrm>
               </p:contentPart>
             </mc:Choice>
-            <mc:Fallback>
+            <mc:Fallback xmlns="">
               <p:pic>
                 <p:nvPicPr>
                   <p:cNvPr id="43" name="Ink 42">
@@ -6700,6 +6701,802 @@
 </p:sld>
 </file>
 
+<file path=ppt/slides/slide4.xml><?xml version="1.0" encoding="utf-8"?>
+<p:sld xmlns:a="http://schemas.openxmlformats.org/drawingml/2006/main" xmlns:r="http://schemas.openxmlformats.org/officeDocument/2006/relationships" xmlns:p="http://schemas.openxmlformats.org/presentationml/2006/main">
+  <p:cSld>
+    <p:spTree>
+      <p:nvGrpSpPr>
+        <p:cNvPr id="1" name=""/>
+        <p:cNvGrpSpPr/>
+        <p:nvPr/>
+      </p:nvGrpSpPr>
+      <p:grpSpPr>
+        <a:xfrm>
+          <a:off x="0" y="0"/>
+          <a:ext cx="0" cy="0"/>
+          <a:chOff x="0" y="0"/>
+          <a:chExt cx="0" cy="0"/>
+        </a:xfrm>
+      </p:grpSpPr>
+      <p:sp>
+        <p:nvSpPr>
+          <p:cNvPr id="35" name="TextBox 34">
+            <a:extLst>
+              <a:ext uri="{FF2B5EF4-FFF2-40B4-BE49-F238E27FC236}">
+                <a16:creationId xmlns:a16="http://schemas.microsoft.com/office/drawing/2014/main" id="{835E8E6F-F519-6544-8986-985555722046}"/>
+              </a:ext>
+            </a:extLst>
+          </p:cNvPr>
+          <p:cNvSpPr txBox="1"/>
+          <p:nvPr/>
+        </p:nvSpPr>
+        <p:spPr>
+          <a:xfrm>
+            <a:off x="2168744" y="2652817"/>
+            <a:ext cx="7544882" cy="523220"/>
+          </a:xfrm>
+          <a:prstGeom prst="rect">
+            <a:avLst/>
+          </a:prstGeom>
+          <a:noFill/>
+          <a:ln>
+            <a:solidFill>
+              <a:schemeClr val="tx1"/>
+            </a:solidFill>
+          </a:ln>
+        </p:spPr>
+        <p:txBody>
+          <a:bodyPr wrap="square" rtlCol="0">
+            <a:spAutoFit/>
+          </a:bodyPr>
+          <a:lstStyle/>
+          <a:p>
+            <a:r>
+              <a:rPr lang="en-US" sz="1400" dirty="0">
+                <a:latin typeface="Courier New" panose="02070309020205020404" pitchFamily="49" charset="0"/>
+                <a:cs typeface="Courier New" panose="02070309020205020404" pitchFamily="49" charset="0"/>
+              </a:rPr>
+              <a:t># fetch parameters via dialog</a:t>
+            </a:r>
+            <a:endParaRPr lang="en-US" sz="1400" dirty="0">
+              <a:solidFill>
+                <a:schemeClr val="accent2"/>
+              </a:solidFill>
+              <a:latin typeface="Courier New" panose="02070309020205020404" pitchFamily="49" charset="0"/>
+              <a:cs typeface="Courier New" panose="02070309020205020404" pitchFamily="49" charset="0"/>
+            </a:endParaRPr>
+          </a:p>
+          <a:p>
+            <a:r>
+              <a:rPr lang="en-US" sz="1400" b="1" dirty="0" err="1">
+                <a:solidFill>
+                  <a:schemeClr val="accent2"/>
+                </a:solidFill>
+                <a:latin typeface="Courier New" panose="02070309020205020404" pitchFamily="49" charset="0"/>
+                <a:cs typeface="Courier New" panose="02070309020205020404" pitchFamily="49" charset="0"/>
+              </a:rPr>
+              <a:t>filter_size</a:t>
+            </a:r>
+            <a:r>
+              <a:rPr lang="en-US" sz="1400" b="1" dirty="0">
+                <a:latin typeface="Courier New" panose="02070309020205020404" pitchFamily="49" charset="0"/>
+                <a:cs typeface="Courier New" panose="02070309020205020404" pitchFamily="49" charset="0"/>
+              </a:rPr>
+              <a:t> </a:t>
+            </a:r>
+            <a:r>
+              <a:rPr lang="en-US" sz="1400" dirty="0">
+                <a:latin typeface="Courier New" panose="02070309020205020404" pitchFamily="49" charset="0"/>
+                <a:cs typeface="Courier New" panose="02070309020205020404" pitchFamily="49" charset="0"/>
+              </a:rPr>
+              <a:t>= </a:t>
+            </a:r>
+            <a:r>
+              <a:rPr lang="en-US" sz="1400" dirty="0" err="1">
+                <a:latin typeface="Courier New" panose="02070309020205020404" pitchFamily="49" charset="0"/>
+                <a:cs typeface="Courier New" panose="02070309020205020404" pitchFamily="49" charset="0"/>
+              </a:rPr>
+              <a:t>create_dialog</a:t>
+            </a:r>
+            <a:r>
+              <a:rPr lang="en-US" sz="1400" dirty="0">
+                <a:latin typeface="Courier New" panose="02070309020205020404" pitchFamily="49" charset="0"/>
+                <a:cs typeface="Courier New" panose="02070309020205020404" pitchFamily="49" charset="0"/>
+              </a:rPr>
+              <a:t>(</a:t>
+            </a:r>
+            <a:r>
+              <a:rPr lang="en-US" sz="1400" dirty="0">
+                <a:solidFill>
+                  <a:schemeClr val="accent1"/>
+                </a:solidFill>
+                <a:latin typeface="Courier New" panose="02070309020205020404" pitchFamily="49" charset="0"/>
+                <a:cs typeface="Courier New" panose="02070309020205020404" pitchFamily="49" charset="0"/>
+              </a:rPr>
+              <a:t>label</a:t>
+            </a:r>
+            <a:r>
+              <a:rPr lang="en-US" sz="1400" dirty="0">
+                <a:latin typeface="Courier New" panose="02070309020205020404" pitchFamily="49" charset="0"/>
+                <a:cs typeface="Courier New" panose="02070309020205020404" pitchFamily="49" charset="0"/>
+              </a:rPr>
+              <a:t>='Filter size', </a:t>
+            </a:r>
+            <a:r>
+              <a:rPr lang="en-US" sz="1400" dirty="0">
+                <a:solidFill>
+                  <a:schemeClr val="accent1"/>
+                </a:solidFill>
+                <a:latin typeface="Courier New" panose="02070309020205020404" pitchFamily="49" charset="0"/>
+                <a:cs typeface="Courier New" panose="02070309020205020404" pitchFamily="49" charset="0"/>
+              </a:rPr>
+              <a:t>type</a:t>
+            </a:r>
+            <a:r>
+              <a:rPr lang="en-US" sz="1400" dirty="0">
+                <a:latin typeface="Courier New" panose="02070309020205020404" pitchFamily="49" charset="0"/>
+                <a:cs typeface="Courier New" panose="02070309020205020404" pitchFamily="49" charset="0"/>
+              </a:rPr>
+              <a:t>=</a:t>
+            </a:r>
+            <a:r>
+              <a:rPr lang="en-US" sz="1400" dirty="0" err="1">
+                <a:latin typeface="Courier New" panose="02070309020205020404" pitchFamily="49" charset="0"/>
+                <a:cs typeface="Courier New" panose="02070309020205020404" pitchFamily="49" charset="0"/>
+              </a:rPr>
+              <a:t>int</a:t>
+            </a:r>
+            <a:r>
+              <a:rPr lang="en-US" sz="1400" dirty="0">
+                <a:latin typeface="Courier New" panose="02070309020205020404" pitchFamily="49" charset="0"/>
+                <a:cs typeface="Courier New" panose="02070309020205020404" pitchFamily="49" charset="0"/>
+              </a:rPr>
+              <a:t>, </a:t>
+            </a:r>
+            <a:r>
+              <a:rPr lang="en-US" sz="1400" dirty="0">
+                <a:solidFill>
+                  <a:schemeClr val="accent1"/>
+                </a:solidFill>
+                <a:latin typeface="Courier New" panose="02070309020205020404" pitchFamily="49" charset="0"/>
+                <a:cs typeface="Courier New" panose="02070309020205020404" pitchFamily="49" charset="0"/>
+              </a:rPr>
+              <a:t>default</a:t>
+            </a:r>
+            <a:r>
+              <a:rPr lang="en-US" sz="1400" dirty="0">
+                <a:latin typeface="Courier New" panose="02070309020205020404" pitchFamily="49" charset="0"/>
+                <a:cs typeface="Courier New" panose="02070309020205020404" pitchFamily="49" charset="0"/>
+              </a:rPr>
+              <a:t>=5)</a:t>
+            </a:r>
+          </a:p>
+        </p:txBody>
+      </p:sp>
+      <p:sp>
+        <p:nvSpPr>
+          <p:cNvPr id="37" name="TextBox 36">
+            <a:extLst>
+              <a:ext uri="{FF2B5EF4-FFF2-40B4-BE49-F238E27FC236}">
+                <a16:creationId xmlns:a16="http://schemas.microsoft.com/office/drawing/2014/main" id="{F8774C70-8659-274E-B77D-12166B4B33EA}"/>
+              </a:ext>
+            </a:extLst>
+          </p:cNvPr>
+          <p:cNvSpPr txBox="1"/>
+          <p:nvPr/>
+        </p:nvSpPr>
+        <p:spPr>
+          <a:xfrm>
+            <a:off x="2168744" y="299716"/>
+            <a:ext cx="7544882" cy="738664"/>
+          </a:xfrm>
+          <a:prstGeom prst="rect">
+            <a:avLst/>
+          </a:prstGeom>
+          <a:noFill/>
+          <a:ln>
+            <a:solidFill>
+              <a:schemeClr val="tx1"/>
+            </a:solidFill>
+          </a:ln>
+        </p:spPr>
+        <p:txBody>
+          <a:bodyPr wrap="square" rtlCol="0">
+            <a:spAutoFit/>
+          </a:bodyPr>
+          <a:lstStyle/>
+          <a:p>
+            <a:r>
+              <a:rPr lang="en-US" sz="1400" dirty="0">
+                <a:latin typeface="Courier New" panose="02070309020205020404" pitchFamily="49" charset="0"/>
+                <a:cs typeface="Courier New" panose="02070309020205020404" pitchFamily="49" charset="0"/>
+              </a:rPr>
+              <a:t>…</a:t>
+            </a:r>
+          </a:p>
+          <a:p>
+            <a:r>
+              <a:rPr lang="en-US" sz="1400" dirty="0" err="1">
+                <a:latin typeface="Courier New" panose="02070309020205020404" pitchFamily="49" charset="0"/>
+                <a:cs typeface="Courier New" panose="02070309020205020404" pitchFamily="49" charset="0"/>
+              </a:rPr>
+              <a:t>smooth_image</a:t>
+            </a:r>
+            <a:r>
+              <a:rPr lang="en-US" sz="1400" dirty="0">
+                <a:latin typeface="Courier New" panose="02070309020205020404" pitchFamily="49" charset="0"/>
+                <a:cs typeface="Courier New" panose="02070309020205020404" pitchFamily="49" charset="0"/>
+              </a:rPr>
+              <a:t> = smooth( image, </a:t>
+            </a:r>
+            <a:r>
+              <a:rPr lang="en-US" sz="1400" b="1" dirty="0">
+                <a:solidFill>
+                  <a:schemeClr val="accent2"/>
+                </a:solidFill>
+                <a:latin typeface="Courier New" panose="02070309020205020404" pitchFamily="49" charset="0"/>
+                <a:cs typeface="Courier New" panose="02070309020205020404" pitchFamily="49" charset="0"/>
+              </a:rPr>
+              <a:t>5</a:t>
+            </a:r>
+            <a:r>
+              <a:rPr lang="en-US" sz="1400" dirty="0">
+                <a:solidFill>
+                  <a:schemeClr val="accent2"/>
+                </a:solidFill>
+                <a:latin typeface="Courier New" panose="02070309020205020404" pitchFamily="49" charset="0"/>
+                <a:cs typeface="Courier New" panose="02070309020205020404" pitchFamily="49" charset="0"/>
+              </a:rPr>
+              <a:t> </a:t>
+            </a:r>
+            <a:r>
+              <a:rPr lang="en-US" sz="1400" dirty="0">
+                <a:latin typeface="Courier New" panose="02070309020205020404" pitchFamily="49" charset="0"/>
+                <a:cs typeface="Courier New" panose="02070309020205020404" pitchFamily="49" charset="0"/>
+              </a:rPr>
+              <a:t>) </a:t>
+            </a:r>
+          </a:p>
+          <a:p>
+            <a:r>
+              <a:rPr lang="en-US" sz="1400" dirty="0">
+                <a:latin typeface="Courier New" panose="02070309020205020404" pitchFamily="49" charset="0"/>
+                <a:cs typeface="Courier New" panose="02070309020205020404" pitchFamily="49" charset="0"/>
+              </a:rPr>
+              <a:t>…</a:t>
+            </a:r>
+            <a:endParaRPr lang="en-US" sz="1400" i="1" dirty="0">
+              <a:solidFill>
+                <a:srgbClr val="00B050"/>
+              </a:solidFill>
+              <a:latin typeface="Courier New" panose="02070309020205020404" pitchFamily="49" charset="0"/>
+              <a:cs typeface="Courier New" panose="02070309020205020404" pitchFamily="49" charset="0"/>
+            </a:endParaRPr>
+          </a:p>
+        </p:txBody>
+      </p:sp>
+      <p:sp>
+        <p:nvSpPr>
+          <p:cNvPr id="45" name="TextBox 44">
+            <a:extLst>
+              <a:ext uri="{FF2B5EF4-FFF2-40B4-BE49-F238E27FC236}">
+                <a16:creationId xmlns:a16="http://schemas.microsoft.com/office/drawing/2014/main" id="{1A4513D5-20CB-9D4D-B82B-F4E8D32FECC4}"/>
+              </a:ext>
+            </a:extLst>
+          </p:cNvPr>
+          <p:cNvSpPr txBox="1"/>
+          <p:nvPr/>
+        </p:nvSpPr>
+        <p:spPr>
+          <a:xfrm>
+            <a:off x="2168744" y="1153101"/>
+            <a:ext cx="7544882" cy="1384995"/>
+          </a:xfrm>
+          <a:prstGeom prst="rect">
+            <a:avLst/>
+          </a:prstGeom>
+          <a:solidFill>
+            <a:schemeClr val="bg1"/>
+          </a:solidFill>
+          <a:ln>
+            <a:solidFill>
+              <a:schemeClr val="tx1"/>
+            </a:solidFill>
+          </a:ln>
+        </p:spPr>
+        <p:txBody>
+          <a:bodyPr wrap="square" rtlCol="0">
+            <a:spAutoFit/>
+          </a:bodyPr>
+          <a:lstStyle/>
+          <a:p>
+            <a:r>
+              <a:rPr lang="en-US" sz="1400" dirty="0">
+                <a:latin typeface="Courier New" panose="02070309020205020404" pitchFamily="49" charset="0"/>
+                <a:cs typeface="Courier New" panose="02070309020205020404" pitchFamily="49" charset="0"/>
+              </a:rPr>
+              <a:t># parameters</a:t>
+            </a:r>
+          </a:p>
+          <a:p>
+            <a:r>
+              <a:rPr lang="en-US" sz="1400" b="1" dirty="0" err="1">
+                <a:solidFill>
+                  <a:schemeClr val="accent2"/>
+                </a:solidFill>
+                <a:latin typeface="Courier New" panose="02070309020205020404" pitchFamily="49" charset="0"/>
+                <a:cs typeface="Courier New" panose="02070309020205020404" pitchFamily="49" charset="0"/>
+              </a:rPr>
+              <a:t>filter_size</a:t>
+            </a:r>
+            <a:r>
+              <a:rPr lang="en-US" sz="1400" b="1" dirty="0">
+                <a:solidFill>
+                  <a:schemeClr val="accent2"/>
+                </a:solidFill>
+                <a:latin typeface="Courier New" panose="02070309020205020404" pitchFamily="49" charset="0"/>
+                <a:cs typeface="Courier New" panose="02070309020205020404" pitchFamily="49" charset="0"/>
+              </a:rPr>
+              <a:t> </a:t>
+            </a:r>
+            <a:r>
+              <a:rPr lang="en-US" sz="1400" dirty="0">
+                <a:latin typeface="Courier New" panose="02070309020205020404" pitchFamily="49" charset="0"/>
+                <a:cs typeface="Courier New" panose="02070309020205020404" pitchFamily="49" charset="0"/>
+              </a:rPr>
+              <a:t>=</a:t>
+            </a:r>
+            <a:r>
+              <a:rPr lang="en-US" sz="1400" dirty="0">
+                <a:solidFill>
+                  <a:schemeClr val="accent2"/>
+                </a:solidFill>
+                <a:latin typeface="Courier New" panose="02070309020205020404" pitchFamily="49" charset="0"/>
+                <a:cs typeface="Courier New" panose="02070309020205020404" pitchFamily="49" charset="0"/>
+              </a:rPr>
+              <a:t> </a:t>
+            </a:r>
+            <a:r>
+              <a:rPr lang="en-US" sz="1400" dirty="0">
+                <a:latin typeface="Courier New" panose="02070309020205020404" pitchFamily="49" charset="0"/>
+                <a:cs typeface="Courier New" panose="02070309020205020404" pitchFamily="49" charset="0"/>
+              </a:rPr>
+              <a:t>5</a:t>
+            </a:r>
+          </a:p>
+          <a:p>
+            <a:r>
+              <a:rPr lang="en-US" sz="1400" dirty="0">
+                <a:latin typeface="Courier New" panose="02070309020205020404" pitchFamily="49" charset="0"/>
+                <a:cs typeface="Courier New" panose="02070309020205020404" pitchFamily="49" charset="0"/>
+              </a:rPr>
+              <a:t># code</a:t>
+            </a:r>
+          </a:p>
+          <a:p>
+            <a:r>
+              <a:rPr lang="en-US" sz="1400" dirty="0">
+                <a:latin typeface="Courier New" panose="02070309020205020404" pitchFamily="49" charset="0"/>
+                <a:cs typeface="Courier New" panose="02070309020205020404" pitchFamily="49" charset="0"/>
+              </a:rPr>
+              <a:t>…</a:t>
+            </a:r>
+          </a:p>
+          <a:p>
+            <a:r>
+              <a:rPr lang="en-US" sz="1400" dirty="0" err="1">
+                <a:latin typeface="Courier New" panose="02070309020205020404" pitchFamily="49" charset="0"/>
+                <a:cs typeface="Courier New" panose="02070309020205020404" pitchFamily="49" charset="0"/>
+              </a:rPr>
+              <a:t>smooth_image</a:t>
+            </a:r>
+            <a:r>
+              <a:rPr lang="en-US" sz="1400" dirty="0">
+                <a:latin typeface="Courier New" panose="02070309020205020404" pitchFamily="49" charset="0"/>
+                <a:cs typeface="Courier New" panose="02070309020205020404" pitchFamily="49" charset="0"/>
+              </a:rPr>
+              <a:t> = smooth( image, </a:t>
+            </a:r>
+            <a:r>
+              <a:rPr lang="en-US" sz="1400" b="1" dirty="0" err="1">
+                <a:solidFill>
+                  <a:schemeClr val="accent2"/>
+                </a:solidFill>
+                <a:latin typeface="Courier New" panose="02070309020205020404" pitchFamily="49" charset="0"/>
+                <a:cs typeface="Courier New" panose="02070309020205020404" pitchFamily="49" charset="0"/>
+              </a:rPr>
+              <a:t>filter_size</a:t>
+            </a:r>
+            <a:r>
+              <a:rPr lang="en-US" sz="1400" b="1" dirty="0">
+                <a:solidFill>
+                  <a:schemeClr val="accent2"/>
+                </a:solidFill>
+                <a:latin typeface="Courier New" panose="02070309020205020404" pitchFamily="49" charset="0"/>
+                <a:cs typeface="Courier New" panose="02070309020205020404" pitchFamily="49" charset="0"/>
+              </a:rPr>
+              <a:t> </a:t>
+            </a:r>
+            <a:r>
+              <a:rPr lang="en-US" sz="1400" dirty="0">
+                <a:latin typeface="Courier New" panose="02070309020205020404" pitchFamily="49" charset="0"/>
+                <a:cs typeface="Courier New" panose="02070309020205020404" pitchFamily="49" charset="0"/>
+              </a:rPr>
+              <a:t>) </a:t>
+            </a:r>
+          </a:p>
+          <a:p>
+            <a:r>
+              <a:rPr lang="en-US" sz="1400" dirty="0">
+                <a:latin typeface="Courier New" panose="02070309020205020404" pitchFamily="49" charset="0"/>
+                <a:cs typeface="Courier New" panose="02070309020205020404" pitchFamily="49" charset="0"/>
+              </a:rPr>
+              <a:t>…</a:t>
+            </a:r>
+            <a:endParaRPr lang="en-US" sz="1400" i="1" dirty="0">
+              <a:solidFill>
+                <a:srgbClr val="00B050"/>
+              </a:solidFill>
+              <a:latin typeface="Courier New" panose="02070309020205020404" pitchFamily="49" charset="0"/>
+              <a:cs typeface="Courier New" panose="02070309020205020404" pitchFamily="49" charset="0"/>
+            </a:endParaRPr>
+          </a:p>
+        </p:txBody>
+      </p:sp>
+      <p:sp>
+        <p:nvSpPr>
+          <p:cNvPr id="47" name="TextBox 46">
+            <a:extLst>
+              <a:ext uri="{FF2B5EF4-FFF2-40B4-BE49-F238E27FC236}">
+                <a16:creationId xmlns:a16="http://schemas.microsoft.com/office/drawing/2014/main" id="{19A9DE26-4E49-C645-96B9-A81BC5C8A58C}"/>
+              </a:ext>
+            </a:extLst>
+          </p:cNvPr>
+          <p:cNvSpPr txBox="1"/>
+          <p:nvPr/>
+        </p:nvSpPr>
+        <p:spPr>
+          <a:xfrm>
+            <a:off x="2168744" y="3317172"/>
+            <a:ext cx="7544882" cy="738664"/>
+          </a:xfrm>
+          <a:prstGeom prst="rect">
+            <a:avLst/>
+          </a:prstGeom>
+          <a:noFill/>
+          <a:ln>
+            <a:solidFill>
+              <a:schemeClr val="tx1"/>
+            </a:solidFill>
+          </a:ln>
+        </p:spPr>
+        <p:txBody>
+          <a:bodyPr wrap="square" rtlCol="0">
+            <a:spAutoFit/>
+          </a:bodyPr>
+          <a:lstStyle/>
+          <a:p>
+            <a:r>
+              <a:rPr lang="en-US" sz="1400" dirty="0">
+                <a:latin typeface="Courier New" panose="02070309020205020404" pitchFamily="49" charset="0"/>
+                <a:cs typeface="Courier New" panose="02070309020205020404" pitchFamily="49" charset="0"/>
+              </a:rPr>
+              <a:t># example usage: run </a:t>
+            </a:r>
+            <a:r>
+              <a:rPr lang="en-US" sz="1400" dirty="0" err="1">
+                <a:latin typeface="Courier New" panose="02070309020205020404" pitchFamily="49" charset="0"/>
+                <a:cs typeface="Courier New" panose="02070309020205020404" pitchFamily="49" charset="0"/>
+              </a:rPr>
+              <a:t>my_script</a:t>
+            </a:r>
+            <a:r>
+              <a:rPr lang="en-US" sz="1400" dirty="0">
+                <a:latin typeface="Courier New" panose="02070309020205020404" pitchFamily="49" charset="0"/>
+                <a:cs typeface="Courier New" panose="02070309020205020404" pitchFamily="49" charset="0"/>
+              </a:rPr>
+              <a:t> –-</a:t>
+            </a:r>
+            <a:r>
+              <a:rPr lang="en-US" sz="1400" dirty="0" err="1">
+                <a:latin typeface="Courier New" panose="02070309020205020404" pitchFamily="49" charset="0"/>
+                <a:cs typeface="Courier New" panose="02070309020205020404" pitchFamily="49" charset="0"/>
+              </a:rPr>
+              <a:t>filter_size</a:t>
+            </a:r>
+            <a:r>
+              <a:rPr lang="en-US" sz="1400" dirty="0">
+                <a:latin typeface="Courier New" panose="02070309020205020404" pitchFamily="49" charset="0"/>
+                <a:cs typeface="Courier New" panose="02070309020205020404" pitchFamily="49" charset="0"/>
+              </a:rPr>
+              <a:t> 5</a:t>
+            </a:r>
+          </a:p>
+          <a:p>
+            <a:r>
+              <a:rPr lang="en-US" sz="1400" dirty="0" err="1">
+                <a:latin typeface="Courier New" panose="02070309020205020404" pitchFamily="49" charset="0"/>
+                <a:cs typeface="Courier New" panose="02070309020205020404" pitchFamily="49" charset="0"/>
+              </a:rPr>
+              <a:t>parser.add_argument</a:t>
+            </a:r>
+            <a:r>
+              <a:rPr lang="en-US" sz="1400" dirty="0">
+                <a:latin typeface="Courier New" panose="02070309020205020404" pitchFamily="49" charset="0"/>
+                <a:cs typeface="Courier New" panose="02070309020205020404" pitchFamily="49" charset="0"/>
+              </a:rPr>
+              <a:t>('</a:t>
+            </a:r>
+            <a:r>
+              <a:rPr lang="en-US" sz="1400" dirty="0" err="1">
+                <a:latin typeface="Courier New" panose="02070309020205020404" pitchFamily="49" charset="0"/>
+                <a:cs typeface="Courier New" panose="02070309020205020404" pitchFamily="49" charset="0"/>
+              </a:rPr>
+              <a:t>filter_size</a:t>
+            </a:r>
+            <a:r>
+              <a:rPr lang="en-US" sz="1400" dirty="0">
+                <a:latin typeface="Courier New" panose="02070309020205020404" pitchFamily="49" charset="0"/>
+                <a:cs typeface="Courier New" panose="02070309020205020404" pitchFamily="49" charset="0"/>
+              </a:rPr>
+              <a:t>', </a:t>
+            </a:r>
+            <a:r>
+              <a:rPr lang="en-US" sz="1400" dirty="0">
+                <a:solidFill>
+                  <a:schemeClr val="accent1"/>
+                </a:solidFill>
+                <a:latin typeface="Courier New" panose="02070309020205020404" pitchFamily="49" charset="0"/>
+                <a:cs typeface="Courier New" panose="02070309020205020404" pitchFamily="49" charset="0"/>
+              </a:rPr>
+              <a:t>type</a:t>
+            </a:r>
+            <a:r>
+              <a:rPr lang="en-US" sz="1400" dirty="0">
+                <a:latin typeface="Courier New" panose="02070309020205020404" pitchFamily="49" charset="0"/>
+                <a:cs typeface="Courier New" panose="02070309020205020404" pitchFamily="49" charset="0"/>
+              </a:rPr>
+              <a:t>=</a:t>
+            </a:r>
+            <a:r>
+              <a:rPr lang="en-US" sz="1400" dirty="0" err="1">
+                <a:latin typeface="Courier New" panose="02070309020205020404" pitchFamily="49" charset="0"/>
+                <a:cs typeface="Courier New" panose="02070309020205020404" pitchFamily="49" charset="0"/>
+              </a:rPr>
+              <a:t>int</a:t>
+            </a:r>
+            <a:r>
+              <a:rPr lang="en-US" sz="1400" dirty="0">
+                <a:latin typeface="Courier New" panose="02070309020205020404" pitchFamily="49" charset="0"/>
+                <a:cs typeface="Courier New" panose="02070309020205020404" pitchFamily="49" charset="0"/>
+              </a:rPr>
+              <a:t>, </a:t>
+            </a:r>
+            <a:r>
+              <a:rPr lang="en-US" sz="1400" dirty="0">
+                <a:solidFill>
+                  <a:schemeClr val="accent1"/>
+                </a:solidFill>
+                <a:latin typeface="Courier New" panose="02070309020205020404" pitchFamily="49" charset="0"/>
+                <a:cs typeface="Courier New" panose="02070309020205020404" pitchFamily="49" charset="0"/>
+              </a:rPr>
+              <a:t>default</a:t>
+            </a:r>
+            <a:r>
+              <a:rPr lang="en-US" sz="1400" dirty="0">
+                <a:latin typeface="Courier New" panose="02070309020205020404" pitchFamily="49" charset="0"/>
+                <a:cs typeface="Courier New" panose="02070309020205020404" pitchFamily="49" charset="0"/>
+              </a:rPr>
+              <a:t>=5)</a:t>
+            </a:r>
+          </a:p>
+          <a:p>
+            <a:r>
+              <a:rPr lang="en-US" sz="1400" b="1" dirty="0" err="1">
+                <a:solidFill>
+                  <a:schemeClr val="accent2"/>
+                </a:solidFill>
+                <a:latin typeface="Courier New" panose="02070309020205020404" pitchFamily="49" charset="0"/>
+                <a:cs typeface="Courier New" panose="02070309020205020404" pitchFamily="49" charset="0"/>
+              </a:rPr>
+              <a:t>filter_size</a:t>
+            </a:r>
+            <a:r>
+              <a:rPr lang="en-US" sz="1400" b="1" dirty="0">
+                <a:latin typeface="Courier New" panose="02070309020205020404" pitchFamily="49" charset="0"/>
+                <a:cs typeface="Courier New" panose="02070309020205020404" pitchFamily="49" charset="0"/>
+              </a:rPr>
+              <a:t> </a:t>
+            </a:r>
+            <a:r>
+              <a:rPr lang="en-US" sz="1400" dirty="0">
+                <a:latin typeface="Courier New" panose="02070309020205020404" pitchFamily="49" charset="0"/>
+                <a:cs typeface="Courier New" panose="02070309020205020404" pitchFamily="49" charset="0"/>
+              </a:rPr>
+              <a:t>= </a:t>
+            </a:r>
+            <a:r>
+              <a:rPr lang="en-US" sz="1400" dirty="0" err="1">
+                <a:latin typeface="Courier New" panose="02070309020205020404" pitchFamily="49" charset="0"/>
+                <a:cs typeface="Courier New" panose="02070309020205020404" pitchFamily="49" charset="0"/>
+              </a:rPr>
+              <a:t>args.filter_size</a:t>
+            </a:r>
+            <a:endParaRPr lang="en-US" sz="1400" dirty="0">
+              <a:latin typeface="Courier New" panose="02070309020205020404" pitchFamily="49" charset="0"/>
+              <a:cs typeface="Courier New" panose="02070309020205020404" pitchFamily="49" charset="0"/>
+            </a:endParaRPr>
+          </a:p>
+        </p:txBody>
+      </p:sp>
+      <p:sp>
+        <p:nvSpPr>
+          <p:cNvPr id="48" name="TextBox 47">
+            <a:extLst>
+              <a:ext uri="{FF2B5EF4-FFF2-40B4-BE49-F238E27FC236}">
+                <a16:creationId xmlns:a16="http://schemas.microsoft.com/office/drawing/2014/main" id="{E0BCA579-3149-1A49-B8BA-E7AC10BC28EB}"/>
+              </a:ext>
+            </a:extLst>
+          </p:cNvPr>
+          <p:cNvSpPr txBox="1"/>
+          <p:nvPr/>
+        </p:nvSpPr>
+        <p:spPr>
+          <a:xfrm>
+            <a:off x="2171244" y="4189095"/>
+            <a:ext cx="7544882" cy="738664"/>
+          </a:xfrm>
+          <a:prstGeom prst="rect">
+            <a:avLst/>
+          </a:prstGeom>
+          <a:noFill/>
+          <a:ln>
+            <a:solidFill>
+              <a:schemeClr val="tx1"/>
+            </a:solidFill>
+          </a:ln>
+        </p:spPr>
+        <p:txBody>
+          <a:bodyPr wrap="square" rtlCol="0">
+            <a:spAutoFit/>
+          </a:bodyPr>
+          <a:lstStyle/>
+          <a:p>
+            <a:r>
+              <a:rPr lang="en-US" sz="1400" dirty="0">
+                <a:latin typeface="Courier New" panose="02070309020205020404" pitchFamily="49" charset="0"/>
+                <a:cs typeface="Courier New" panose="02070309020205020404" pitchFamily="49" charset="0"/>
+              </a:rPr>
+              <a:t># example usage: run </a:t>
+            </a:r>
+            <a:r>
+              <a:rPr lang="en-US" sz="1400" dirty="0" err="1">
+                <a:latin typeface="Courier New" panose="02070309020205020404" pitchFamily="49" charset="0"/>
+                <a:cs typeface="Courier New" panose="02070309020205020404" pitchFamily="49" charset="0"/>
+              </a:rPr>
+              <a:t>my_script</a:t>
+            </a:r>
+            <a:r>
+              <a:rPr lang="en-US" sz="1400" dirty="0">
+                <a:latin typeface="Courier New" panose="02070309020205020404" pitchFamily="49" charset="0"/>
+                <a:cs typeface="Courier New" panose="02070309020205020404" pitchFamily="49" charset="0"/>
+              </a:rPr>
+              <a:t> –-config /Users/</a:t>
+            </a:r>
+            <a:r>
+              <a:rPr lang="en-US" sz="1400" dirty="0" err="1">
+                <a:latin typeface="Courier New" panose="02070309020205020404" pitchFamily="49" charset="0"/>
+                <a:cs typeface="Courier New" panose="02070309020205020404" pitchFamily="49" charset="0"/>
+              </a:rPr>
+              <a:t>config.yml</a:t>
+            </a:r>
+            <a:endParaRPr lang="en-US" sz="1400" dirty="0">
+              <a:latin typeface="Courier New" panose="02070309020205020404" pitchFamily="49" charset="0"/>
+              <a:cs typeface="Courier New" panose="02070309020205020404" pitchFamily="49" charset="0"/>
+            </a:endParaRPr>
+          </a:p>
+          <a:p>
+            <a:r>
+              <a:rPr lang="en-US" sz="1400" dirty="0" err="1">
+                <a:latin typeface="Courier New" panose="02070309020205020404" pitchFamily="49" charset="0"/>
+                <a:cs typeface="Courier New" panose="02070309020205020404" pitchFamily="49" charset="0"/>
+              </a:rPr>
+              <a:t>parser.add_argument</a:t>
+            </a:r>
+            <a:r>
+              <a:rPr lang="en-US" sz="1400" dirty="0">
+                <a:latin typeface="Courier New" panose="02070309020205020404" pitchFamily="49" charset="0"/>
+                <a:cs typeface="Courier New" panose="02070309020205020404" pitchFamily="49" charset="0"/>
+              </a:rPr>
+              <a:t>('config', </a:t>
+            </a:r>
+            <a:r>
+              <a:rPr lang="en-US" sz="1400" dirty="0">
+                <a:solidFill>
+                  <a:schemeClr val="accent1"/>
+                </a:solidFill>
+                <a:latin typeface="Courier New" panose="02070309020205020404" pitchFamily="49" charset="0"/>
+                <a:cs typeface="Courier New" panose="02070309020205020404" pitchFamily="49" charset="0"/>
+              </a:rPr>
+              <a:t>type</a:t>
+            </a:r>
+            <a:r>
+              <a:rPr lang="en-US" sz="1400" dirty="0">
+                <a:latin typeface="Courier New" panose="02070309020205020404" pitchFamily="49" charset="0"/>
+                <a:cs typeface="Courier New" panose="02070309020205020404" pitchFamily="49" charset="0"/>
+              </a:rPr>
+              <a:t>=String)</a:t>
+            </a:r>
+          </a:p>
+          <a:p>
+            <a:r>
+              <a:rPr lang="en-US" sz="1400" b="1" dirty="0" err="1">
+                <a:solidFill>
+                  <a:schemeClr val="accent2"/>
+                </a:solidFill>
+                <a:latin typeface="Courier New" panose="02070309020205020404" pitchFamily="49" charset="0"/>
+                <a:cs typeface="Courier New" panose="02070309020205020404" pitchFamily="49" charset="0"/>
+              </a:rPr>
+              <a:t>filter_size</a:t>
+            </a:r>
+            <a:r>
+              <a:rPr lang="en-US" sz="1400" b="1" dirty="0">
+                <a:latin typeface="Courier New" panose="02070309020205020404" pitchFamily="49" charset="0"/>
+                <a:cs typeface="Courier New" panose="02070309020205020404" pitchFamily="49" charset="0"/>
+              </a:rPr>
+              <a:t> </a:t>
+            </a:r>
+            <a:r>
+              <a:rPr lang="en-US" sz="1400" dirty="0">
+                <a:latin typeface="Courier New" panose="02070309020205020404" pitchFamily="49" charset="0"/>
+                <a:cs typeface="Courier New" panose="02070309020205020404" pitchFamily="49" charset="0"/>
+              </a:rPr>
+              <a:t>= parse( </a:t>
+            </a:r>
+            <a:r>
+              <a:rPr lang="en-US" sz="1400" dirty="0" err="1">
+                <a:latin typeface="Courier New" panose="02070309020205020404" pitchFamily="49" charset="0"/>
+                <a:cs typeface="Courier New" panose="02070309020205020404" pitchFamily="49" charset="0"/>
+              </a:rPr>
+              <a:t>args.config</a:t>
+            </a:r>
+            <a:r>
+              <a:rPr lang="en-US" sz="1400" dirty="0">
+                <a:latin typeface="Courier New" panose="02070309020205020404" pitchFamily="49" charset="0"/>
+                <a:cs typeface="Courier New" panose="02070309020205020404" pitchFamily="49" charset="0"/>
+              </a:rPr>
+              <a:t>, '</a:t>
+            </a:r>
+            <a:r>
+              <a:rPr lang="en-US" sz="1400" dirty="0" err="1">
+                <a:latin typeface="Courier New" panose="02070309020205020404" pitchFamily="49" charset="0"/>
+                <a:cs typeface="Courier New" panose="02070309020205020404" pitchFamily="49" charset="0"/>
+              </a:rPr>
+              <a:t>filter_size</a:t>
+            </a:r>
+            <a:r>
+              <a:rPr lang="en-US" sz="1400" dirty="0">
+                <a:latin typeface="Courier New" panose="02070309020205020404" pitchFamily="49" charset="0"/>
+                <a:cs typeface="Courier New" panose="02070309020205020404" pitchFamily="49" charset="0"/>
+              </a:rPr>
+              <a:t>' )</a:t>
+            </a:r>
+          </a:p>
+        </p:txBody>
+      </p:sp>
+    </p:spTree>
+    <p:extLst>
+      <p:ext uri="{BB962C8B-B14F-4D97-AF65-F5344CB8AC3E}">
+        <p14:creationId xmlns:p14="http://schemas.microsoft.com/office/powerpoint/2010/main" val="1375775050"/>
+      </p:ext>
+    </p:extLst>
+  </p:cSld>
+  <p:clrMapOvr>
+    <a:masterClrMapping/>
+  </p:clrMapOvr>
+</p:sld>
+</file>
+
 <file path=ppt/theme/theme1.xml><?xml version="1.0" encoding="utf-8"?>
 <a:theme xmlns:a="http://schemas.openxmlformats.org/drawingml/2006/main" name="Office Theme">
   <a:themeElements>

</xml_diff>

<commit_message>
added exercise and figure
</commit_message>
<xml_diff>
--- a/figures/resources/fetching_user_input.pptx
+++ b/figures/resources/fetching_user_input.pptx
@@ -9,6 +9,7 @@
     <p:sldId id="257" r:id="rId3"/>
     <p:sldId id="258" r:id="rId4"/>
     <p:sldId id="259" r:id="rId5"/>
+    <p:sldId id="260" r:id="rId6"/>
   </p:sldIdLst>
   <p:sldSz cx="12192000" cy="6858000"/>
   <p:notesSz cx="6858000" cy="9144000"/>
@@ -488,7 +489,7 @@
           <a:p>
             <a:fld id="{783D4129-6E14-4DEB-A88B-FA76BDE6DE9E}" type="datetimeFigureOut">
               <a:rPr lang="en-DE" smtClean="0"/>
-              <a:t>3/18/22</a:t>
+              <a:t>20/10/2022</a:t>
             </a:fld>
             <a:endParaRPr lang="en-DE"/>
           </a:p>
@@ -688,7 +689,7 @@
           <a:p>
             <a:fld id="{783D4129-6E14-4DEB-A88B-FA76BDE6DE9E}" type="datetimeFigureOut">
               <a:rPr lang="en-DE" smtClean="0"/>
-              <a:t>3/18/22</a:t>
+              <a:t>20/10/2022</a:t>
             </a:fld>
             <a:endParaRPr lang="en-DE"/>
           </a:p>
@@ -898,7 +899,7 @@
           <a:p>
             <a:fld id="{783D4129-6E14-4DEB-A88B-FA76BDE6DE9E}" type="datetimeFigureOut">
               <a:rPr lang="en-DE" smtClean="0"/>
-              <a:t>3/18/22</a:t>
+              <a:t>20/10/2022</a:t>
             </a:fld>
             <a:endParaRPr lang="en-DE"/>
           </a:p>
@@ -1098,7 +1099,7 @@
           <a:p>
             <a:fld id="{783D4129-6E14-4DEB-A88B-FA76BDE6DE9E}" type="datetimeFigureOut">
               <a:rPr lang="en-DE" smtClean="0"/>
-              <a:t>3/18/22</a:t>
+              <a:t>20/10/2022</a:t>
             </a:fld>
             <a:endParaRPr lang="en-DE"/>
           </a:p>
@@ -1374,7 +1375,7 @@
           <a:p>
             <a:fld id="{783D4129-6E14-4DEB-A88B-FA76BDE6DE9E}" type="datetimeFigureOut">
               <a:rPr lang="en-DE" smtClean="0"/>
-              <a:t>3/18/22</a:t>
+              <a:t>20/10/2022</a:t>
             </a:fld>
             <a:endParaRPr lang="en-DE"/>
           </a:p>
@@ -1642,7 +1643,7 @@
           <a:p>
             <a:fld id="{783D4129-6E14-4DEB-A88B-FA76BDE6DE9E}" type="datetimeFigureOut">
               <a:rPr lang="en-DE" smtClean="0"/>
-              <a:t>3/18/22</a:t>
+              <a:t>20/10/2022</a:t>
             </a:fld>
             <a:endParaRPr lang="en-DE"/>
           </a:p>
@@ -2057,7 +2058,7 @@
           <a:p>
             <a:fld id="{783D4129-6E14-4DEB-A88B-FA76BDE6DE9E}" type="datetimeFigureOut">
               <a:rPr lang="en-DE" smtClean="0"/>
-              <a:t>3/18/22</a:t>
+              <a:t>20/10/2022</a:t>
             </a:fld>
             <a:endParaRPr lang="en-DE"/>
           </a:p>
@@ -2199,7 +2200,7 @@
           <a:p>
             <a:fld id="{783D4129-6E14-4DEB-A88B-FA76BDE6DE9E}" type="datetimeFigureOut">
               <a:rPr lang="en-DE" smtClean="0"/>
-              <a:t>3/18/22</a:t>
+              <a:t>20/10/2022</a:t>
             </a:fld>
             <a:endParaRPr lang="en-DE"/>
           </a:p>
@@ -2312,7 +2313,7 @@
           <a:p>
             <a:fld id="{783D4129-6E14-4DEB-A88B-FA76BDE6DE9E}" type="datetimeFigureOut">
               <a:rPr lang="en-DE" smtClean="0"/>
-              <a:t>3/18/22</a:t>
+              <a:t>20/10/2022</a:t>
             </a:fld>
             <a:endParaRPr lang="en-DE"/>
           </a:p>
@@ -2625,7 +2626,7 @@
           <a:p>
             <a:fld id="{783D4129-6E14-4DEB-A88B-FA76BDE6DE9E}" type="datetimeFigureOut">
               <a:rPr lang="en-DE" smtClean="0"/>
-              <a:t>3/18/22</a:t>
+              <a:t>20/10/2022</a:t>
             </a:fld>
             <a:endParaRPr lang="en-DE"/>
           </a:p>
@@ -2914,7 +2915,7 @@
           <a:p>
             <a:fld id="{783D4129-6E14-4DEB-A88B-FA76BDE6DE9E}" type="datetimeFigureOut">
               <a:rPr lang="en-DE" smtClean="0"/>
-              <a:t>3/18/22</a:t>
+              <a:t>20/10/2022</a:t>
             </a:fld>
             <a:endParaRPr lang="en-DE"/>
           </a:p>
@@ -3157,7 +3158,7 @@
           <a:p>
             <a:fld id="{783D4129-6E14-4DEB-A88B-FA76BDE6DE9E}" type="datetimeFigureOut">
               <a:rPr lang="en-DE" smtClean="0"/>
-              <a:t>3/18/22</a:t>
+              <a:t>20/10/2022</a:t>
             </a:fld>
             <a:endParaRPr lang="en-DE"/>
           </a:p>
@@ -7515,6 +7516,1022 @@
 </p:sld>
 </file>
 
+<file path=ppt/slides/slide5.xml><?xml version="1.0" encoding="utf-8"?>
+<p:sld xmlns:a="http://schemas.openxmlformats.org/drawingml/2006/main" xmlns:r="http://schemas.openxmlformats.org/officeDocument/2006/relationships" xmlns:p="http://schemas.openxmlformats.org/presentationml/2006/main">
+  <p:cSld>
+    <p:spTree>
+      <p:nvGrpSpPr>
+        <p:cNvPr id="1" name=""/>
+        <p:cNvGrpSpPr/>
+        <p:nvPr/>
+      </p:nvGrpSpPr>
+      <p:grpSpPr>
+        <a:xfrm>
+          <a:off x="0" y="0"/>
+          <a:ext cx="0" cy="0"/>
+          <a:chOff x="0" y="0"/>
+          <a:chExt cx="0" cy="0"/>
+        </a:xfrm>
+      </p:grpSpPr>
+      <p:pic>
+        <p:nvPicPr>
+          <p:cNvPr id="7" name="Picture 6">
+            <a:extLst>
+              <a:ext uri="{FF2B5EF4-FFF2-40B4-BE49-F238E27FC236}">
+                <a16:creationId xmlns:a16="http://schemas.microsoft.com/office/drawing/2014/main" id="{4928F077-87AF-400D-B22D-6C03BF104E61}"/>
+              </a:ext>
+            </a:extLst>
+          </p:cNvPr>
+          <p:cNvPicPr>
+            <a:picLocks noChangeAspect="1"/>
+          </p:cNvPicPr>
+          <p:nvPr/>
+        </p:nvPicPr>
+        <p:blipFill>
+          <a:blip r:embed="rId2"/>
+          <a:stretch>
+            <a:fillRect/>
+          </a:stretch>
+        </p:blipFill>
+        <p:spPr>
+          <a:xfrm>
+            <a:off x="379832" y="658097"/>
+            <a:ext cx="2711234" cy="2446656"/>
+          </a:xfrm>
+          <a:prstGeom prst="rect">
+            <a:avLst/>
+          </a:prstGeom>
+        </p:spPr>
+      </p:pic>
+      <p:pic>
+        <p:nvPicPr>
+          <p:cNvPr id="9" name="Picture 8">
+            <a:extLst>
+              <a:ext uri="{FF2B5EF4-FFF2-40B4-BE49-F238E27FC236}">
+                <a16:creationId xmlns:a16="http://schemas.microsoft.com/office/drawing/2014/main" id="{6B0417D8-9BEA-410E-BEA2-D9060A2B7015}"/>
+              </a:ext>
+            </a:extLst>
+          </p:cNvPr>
+          <p:cNvPicPr>
+            <a:picLocks noChangeAspect="1"/>
+          </p:cNvPicPr>
+          <p:nvPr/>
+        </p:nvPicPr>
+        <p:blipFill rotWithShape="1">
+          <a:blip r:embed="rId3"/>
+          <a:srcRect l="7258" t="4954" r="6243"/>
+          <a:stretch/>
+        </p:blipFill>
+        <p:spPr>
+          <a:xfrm>
+            <a:off x="6484826" y="2920999"/>
+            <a:ext cx="1394856" cy="1379862"/>
+          </a:xfrm>
+          <a:prstGeom prst="rect">
+            <a:avLst/>
+          </a:prstGeom>
+        </p:spPr>
+      </p:pic>
+      <p:pic>
+        <p:nvPicPr>
+          <p:cNvPr id="44" name="Picture 43">
+            <a:extLst>
+              <a:ext uri="{FF2B5EF4-FFF2-40B4-BE49-F238E27FC236}">
+                <a16:creationId xmlns:a16="http://schemas.microsoft.com/office/drawing/2014/main" id="{714ED53E-E9F4-480E-B721-B4166C206C66}"/>
+              </a:ext>
+            </a:extLst>
+          </p:cNvPr>
+          <p:cNvPicPr>
+            <a:picLocks noChangeAspect="1"/>
+          </p:cNvPicPr>
+          <p:nvPr/>
+        </p:nvPicPr>
+        <p:blipFill>
+          <a:blip r:embed="rId4"/>
+          <a:stretch>
+            <a:fillRect/>
+          </a:stretch>
+        </p:blipFill>
+        <p:spPr>
+          <a:xfrm>
+            <a:off x="8790293" y="2605230"/>
+            <a:ext cx="1816912" cy="1647539"/>
+          </a:xfrm>
+          <a:prstGeom prst="rect">
+            <a:avLst/>
+          </a:prstGeom>
+        </p:spPr>
+      </p:pic>
+      <p:grpSp>
+        <p:nvGrpSpPr>
+          <p:cNvPr id="61" name="Group 60">
+            <a:extLst>
+              <a:ext uri="{FF2B5EF4-FFF2-40B4-BE49-F238E27FC236}">
+                <a16:creationId xmlns:a16="http://schemas.microsoft.com/office/drawing/2014/main" id="{12BB0854-90E0-430F-BEAF-7EBE5627AF57}"/>
+              </a:ext>
+            </a:extLst>
+          </p:cNvPr>
+          <p:cNvGrpSpPr/>
+          <p:nvPr/>
+        </p:nvGrpSpPr>
+        <p:grpSpPr>
+          <a:xfrm>
+            <a:off x="3539251" y="213751"/>
+            <a:ext cx="2778257" cy="3335347"/>
+            <a:chOff x="3598009" y="1425981"/>
+            <a:chExt cx="2778257" cy="3335347"/>
+          </a:xfrm>
+        </p:grpSpPr>
+        <p:sp>
+          <p:nvSpPr>
+            <p:cNvPr id="16" name="Minus Sign 15">
+              <a:extLst>
+                <a:ext uri="{FF2B5EF4-FFF2-40B4-BE49-F238E27FC236}">
+                  <a16:creationId xmlns:a16="http://schemas.microsoft.com/office/drawing/2014/main" id="{03365BE0-8535-444F-9309-5377F5099BA6}"/>
+                </a:ext>
+              </a:extLst>
+            </p:cNvPr>
+            <p:cNvSpPr/>
+            <p:nvPr/>
+          </p:nvSpPr>
+          <p:spPr>
+            <a:xfrm rot="16200000">
+              <a:off x="3348168" y="3321532"/>
+              <a:ext cx="1772405" cy="696877"/>
+            </a:xfrm>
+            <a:prstGeom prst="mathMinus">
+              <a:avLst/>
+            </a:prstGeom>
+          </p:spPr>
+          <p:style>
+            <a:lnRef idx="2">
+              <a:schemeClr val="accent1">
+                <a:shade val="50000"/>
+              </a:schemeClr>
+            </a:lnRef>
+            <a:fillRef idx="1">
+              <a:schemeClr val="accent1"/>
+            </a:fillRef>
+            <a:effectRef idx="0">
+              <a:schemeClr val="accent1"/>
+            </a:effectRef>
+            <a:fontRef idx="minor">
+              <a:schemeClr val="lt1"/>
+            </a:fontRef>
+          </p:style>
+          <p:txBody>
+            <a:bodyPr rtlCol="0" anchor="ctr"/>
+            <a:lstStyle/>
+            <a:p>
+              <a:pPr algn="ctr"/>
+              <a:endParaRPr lang="en-DE"/>
+            </a:p>
+          </p:txBody>
+        </p:sp>
+        <p:sp>
+          <p:nvSpPr>
+            <p:cNvPr id="17" name="Minus Sign 16">
+              <a:extLst>
+                <a:ext uri="{FF2B5EF4-FFF2-40B4-BE49-F238E27FC236}">
+                  <a16:creationId xmlns:a16="http://schemas.microsoft.com/office/drawing/2014/main" id="{688213FC-7E46-4D51-96B6-652E83ED5377}"/>
+                </a:ext>
+              </a:extLst>
+            </p:cNvPr>
+            <p:cNvSpPr/>
+            <p:nvPr/>
+          </p:nvSpPr>
+          <p:spPr>
+            <a:xfrm rot="16200000">
+              <a:off x="2278774" y="2745216"/>
+              <a:ext cx="3335347" cy="696877"/>
+            </a:xfrm>
+            <a:prstGeom prst="mathMinus">
+              <a:avLst/>
+            </a:prstGeom>
+          </p:spPr>
+          <p:style>
+            <a:lnRef idx="2">
+              <a:schemeClr val="accent1">
+                <a:shade val="50000"/>
+              </a:schemeClr>
+            </a:lnRef>
+            <a:fillRef idx="1">
+              <a:schemeClr val="accent1"/>
+            </a:fillRef>
+            <a:effectRef idx="0">
+              <a:schemeClr val="accent1"/>
+            </a:effectRef>
+            <a:fontRef idx="minor">
+              <a:schemeClr val="lt1"/>
+            </a:fontRef>
+          </p:style>
+          <p:txBody>
+            <a:bodyPr rtlCol="0" anchor="ctr"/>
+            <a:lstStyle/>
+            <a:p>
+              <a:pPr algn="ctr"/>
+              <a:endParaRPr lang="en-DE"/>
+            </a:p>
+          </p:txBody>
+        </p:sp>
+        <p:sp>
+          <p:nvSpPr>
+            <p:cNvPr id="18" name="Minus Sign 17">
+              <a:extLst>
+                <a:ext uri="{FF2B5EF4-FFF2-40B4-BE49-F238E27FC236}">
+                  <a16:creationId xmlns:a16="http://schemas.microsoft.com/office/drawing/2014/main" id="{300E6F7C-EE35-40B0-ADE4-52A094FF51B2}"/>
+                </a:ext>
+              </a:extLst>
+            </p:cNvPr>
+            <p:cNvSpPr/>
+            <p:nvPr/>
+          </p:nvSpPr>
+          <p:spPr>
+            <a:xfrm rot="16200000">
+              <a:off x="4183391" y="3723870"/>
+              <a:ext cx="684408" cy="696877"/>
+            </a:xfrm>
+            <a:prstGeom prst="mathMinus">
+              <a:avLst/>
+            </a:prstGeom>
+          </p:spPr>
+          <p:style>
+            <a:lnRef idx="2">
+              <a:schemeClr val="accent1">
+                <a:shade val="50000"/>
+              </a:schemeClr>
+            </a:lnRef>
+            <a:fillRef idx="1">
+              <a:schemeClr val="accent1"/>
+            </a:fillRef>
+            <a:effectRef idx="0">
+              <a:schemeClr val="accent1"/>
+            </a:effectRef>
+            <a:fontRef idx="minor">
+              <a:schemeClr val="lt1"/>
+            </a:fontRef>
+          </p:style>
+          <p:txBody>
+            <a:bodyPr rtlCol="0" anchor="ctr"/>
+            <a:lstStyle/>
+            <a:p>
+              <a:pPr algn="ctr"/>
+              <a:endParaRPr lang="en-DE"/>
+            </a:p>
+          </p:txBody>
+        </p:sp>
+        <p:sp>
+          <p:nvSpPr>
+            <p:cNvPr id="19" name="Minus Sign 18">
+              <a:extLst>
+                <a:ext uri="{FF2B5EF4-FFF2-40B4-BE49-F238E27FC236}">
+                  <a16:creationId xmlns:a16="http://schemas.microsoft.com/office/drawing/2014/main" id="{743E7D43-6DC4-4C25-8638-4D0495E54B2F}"/>
+                </a:ext>
+              </a:extLst>
+            </p:cNvPr>
+            <p:cNvSpPr/>
+            <p:nvPr/>
+          </p:nvSpPr>
+          <p:spPr>
+            <a:xfrm rot="16200000">
+              <a:off x="4644216" y="3835177"/>
+              <a:ext cx="372558" cy="696877"/>
+            </a:xfrm>
+            <a:prstGeom prst="mathMinus">
+              <a:avLst/>
+            </a:prstGeom>
+          </p:spPr>
+          <p:style>
+            <a:lnRef idx="2">
+              <a:schemeClr val="accent1">
+                <a:shade val="50000"/>
+              </a:schemeClr>
+            </a:lnRef>
+            <a:fillRef idx="1">
+              <a:schemeClr val="accent1"/>
+            </a:fillRef>
+            <a:effectRef idx="0">
+              <a:schemeClr val="accent1"/>
+            </a:effectRef>
+            <a:fontRef idx="minor">
+              <a:schemeClr val="lt1"/>
+            </a:fontRef>
+          </p:style>
+          <p:txBody>
+            <a:bodyPr rtlCol="0" anchor="ctr"/>
+            <a:lstStyle/>
+            <a:p>
+              <a:pPr algn="ctr"/>
+              <a:endParaRPr lang="en-DE"/>
+            </a:p>
+          </p:txBody>
+        </p:sp>
+        <p:sp>
+          <p:nvSpPr>
+            <p:cNvPr id="20" name="Minus Sign 19">
+              <a:extLst>
+                <a:ext uri="{FF2B5EF4-FFF2-40B4-BE49-F238E27FC236}">
+                  <a16:creationId xmlns:a16="http://schemas.microsoft.com/office/drawing/2014/main" id="{24B60428-793D-4212-92D2-6782E56FC9EF}"/>
+                </a:ext>
+              </a:extLst>
+            </p:cNvPr>
+            <p:cNvSpPr/>
+            <p:nvPr/>
+          </p:nvSpPr>
+          <p:spPr>
+            <a:xfrm rot="16200000">
+              <a:off x="4547872" y="3321533"/>
+              <a:ext cx="1772405" cy="696877"/>
+            </a:xfrm>
+            <a:prstGeom prst="mathMinus">
+              <a:avLst/>
+            </a:prstGeom>
+          </p:spPr>
+          <p:style>
+            <a:lnRef idx="2">
+              <a:schemeClr val="accent1">
+                <a:shade val="50000"/>
+              </a:schemeClr>
+            </a:lnRef>
+            <a:fillRef idx="1">
+              <a:schemeClr val="accent1"/>
+            </a:fillRef>
+            <a:effectRef idx="0">
+              <a:schemeClr val="accent1"/>
+            </a:effectRef>
+            <a:fontRef idx="minor">
+              <a:schemeClr val="lt1"/>
+            </a:fontRef>
+          </p:style>
+          <p:txBody>
+            <a:bodyPr rtlCol="0" anchor="ctr"/>
+            <a:lstStyle/>
+            <a:p>
+              <a:pPr algn="ctr"/>
+              <a:endParaRPr lang="en-DE"/>
+            </a:p>
+          </p:txBody>
+        </p:sp>
+        <p:sp>
+          <p:nvSpPr>
+            <p:cNvPr id="21" name="Minus Sign 20">
+              <a:extLst>
+                <a:ext uri="{FF2B5EF4-FFF2-40B4-BE49-F238E27FC236}">
+                  <a16:creationId xmlns:a16="http://schemas.microsoft.com/office/drawing/2014/main" id="{125FDD82-4F4B-4F67-B633-538FCAF29C2C}"/>
+                </a:ext>
+              </a:extLst>
+            </p:cNvPr>
+            <p:cNvSpPr/>
+            <p:nvPr/>
+          </p:nvSpPr>
+          <p:spPr>
+            <a:xfrm rot="16200000">
+              <a:off x="4072231" y="2745216"/>
+              <a:ext cx="3335347" cy="696877"/>
+            </a:xfrm>
+            <a:prstGeom prst="mathMinus">
+              <a:avLst/>
+            </a:prstGeom>
+          </p:spPr>
+          <p:style>
+            <a:lnRef idx="2">
+              <a:schemeClr val="accent1">
+                <a:shade val="50000"/>
+              </a:schemeClr>
+            </a:lnRef>
+            <a:fillRef idx="1">
+              <a:schemeClr val="accent1"/>
+            </a:fillRef>
+            <a:effectRef idx="0">
+              <a:schemeClr val="accent1"/>
+            </a:effectRef>
+            <a:fontRef idx="minor">
+              <a:schemeClr val="lt1"/>
+            </a:fontRef>
+          </p:style>
+          <p:txBody>
+            <a:bodyPr rtlCol="0" anchor="ctr"/>
+            <a:lstStyle/>
+            <a:p>
+              <a:pPr algn="ctr"/>
+              <a:endParaRPr lang="en-DE"/>
+            </a:p>
+          </p:txBody>
+        </p:sp>
+        <p:sp>
+          <p:nvSpPr>
+            <p:cNvPr id="22" name="Minus Sign 21">
+              <a:extLst>
+                <a:ext uri="{FF2B5EF4-FFF2-40B4-BE49-F238E27FC236}">
+                  <a16:creationId xmlns:a16="http://schemas.microsoft.com/office/drawing/2014/main" id="{351F0C2F-63F4-4503-84D1-7DA1EB39097E}"/>
+                </a:ext>
+              </a:extLst>
+            </p:cNvPr>
+            <p:cNvSpPr/>
+            <p:nvPr/>
+          </p:nvSpPr>
+          <p:spPr>
+            <a:xfrm rot="16200000">
+              <a:off x="4791751" y="3723871"/>
+              <a:ext cx="684408" cy="696877"/>
+            </a:xfrm>
+            <a:prstGeom prst="mathMinus">
+              <a:avLst/>
+            </a:prstGeom>
+          </p:spPr>
+          <p:style>
+            <a:lnRef idx="2">
+              <a:schemeClr val="accent1">
+                <a:shade val="50000"/>
+              </a:schemeClr>
+            </a:lnRef>
+            <a:fillRef idx="1">
+              <a:schemeClr val="accent1"/>
+            </a:fillRef>
+            <a:effectRef idx="0">
+              <a:schemeClr val="accent1"/>
+            </a:effectRef>
+            <a:fontRef idx="minor">
+              <a:schemeClr val="lt1"/>
+            </a:fontRef>
+          </p:style>
+          <p:txBody>
+            <a:bodyPr rtlCol="0" anchor="ctr"/>
+            <a:lstStyle/>
+            <a:p>
+              <a:pPr algn="ctr"/>
+              <a:endParaRPr lang="en-DE"/>
+            </a:p>
+          </p:txBody>
+        </p:sp>
+        <p:sp>
+          <p:nvSpPr>
+            <p:cNvPr id="23" name="Minus Sign 22">
+              <a:extLst>
+                <a:ext uri="{FF2B5EF4-FFF2-40B4-BE49-F238E27FC236}">
+                  <a16:creationId xmlns:a16="http://schemas.microsoft.com/office/drawing/2014/main" id="{2A7F3865-B20F-4457-B4ED-89C406416625}"/>
+                </a:ext>
+              </a:extLst>
+            </p:cNvPr>
+            <p:cNvSpPr/>
+            <p:nvPr/>
+          </p:nvSpPr>
+          <p:spPr>
+            <a:xfrm rot="16200000">
+              <a:off x="4360154" y="2745216"/>
+              <a:ext cx="3335347" cy="696877"/>
+            </a:xfrm>
+            <a:prstGeom prst="mathMinus">
+              <a:avLst/>
+            </a:prstGeom>
+            <a:solidFill>
+              <a:schemeClr val="accent2"/>
+            </a:solidFill>
+          </p:spPr>
+          <p:style>
+            <a:lnRef idx="2">
+              <a:schemeClr val="accent1">
+                <a:shade val="50000"/>
+              </a:schemeClr>
+            </a:lnRef>
+            <a:fillRef idx="1">
+              <a:schemeClr val="accent1"/>
+            </a:fillRef>
+            <a:effectRef idx="0">
+              <a:schemeClr val="accent1"/>
+            </a:effectRef>
+            <a:fontRef idx="minor">
+              <a:schemeClr val="lt1"/>
+            </a:fontRef>
+          </p:style>
+          <p:txBody>
+            <a:bodyPr rtlCol="0" anchor="ctr"/>
+            <a:lstStyle/>
+            <a:p>
+              <a:pPr algn="ctr"/>
+              <a:endParaRPr lang="en-DE"/>
+            </a:p>
+          </p:txBody>
+        </p:sp>
+        <p:cxnSp>
+          <p:nvCxnSpPr>
+            <p:cNvPr id="25" name="Straight Arrow Connector 24">
+              <a:extLst>
+                <a:ext uri="{FF2B5EF4-FFF2-40B4-BE49-F238E27FC236}">
+                  <a16:creationId xmlns:a16="http://schemas.microsoft.com/office/drawing/2014/main" id="{5F1A5828-1F50-4D62-958B-4CA1559A49DF}"/>
+                </a:ext>
+              </a:extLst>
+            </p:cNvPr>
+            <p:cNvCxnSpPr/>
+            <p:nvPr/>
+          </p:nvCxnSpPr>
+          <p:spPr>
+            <a:xfrm>
+              <a:off x="4040278" y="3282978"/>
+              <a:ext cx="119691" cy="0"/>
+            </a:xfrm>
+            <a:prstGeom prst="straightConnector1">
+              <a:avLst/>
+            </a:prstGeom>
+            <a:ln>
+              <a:tailEnd type="triangle"/>
+            </a:ln>
+          </p:spPr>
+          <p:style>
+            <a:lnRef idx="1">
+              <a:schemeClr val="accent1"/>
+            </a:lnRef>
+            <a:fillRef idx="0">
+              <a:schemeClr val="accent1"/>
+            </a:fillRef>
+            <a:effectRef idx="0">
+              <a:schemeClr val="accent1"/>
+            </a:effectRef>
+            <a:fontRef idx="minor">
+              <a:schemeClr val="tx1"/>
+            </a:fontRef>
+          </p:style>
+        </p:cxnSp>
+        <p:cxnSp>
+          <p:nvCxnSpPr>
+            <p:cNvPr id="29" name="Straight Arrow Connector 28">
+              <a:extLst>
+                <a:ext uri="{FF2B5EF4-FFF2-40B4-BE49-F238E27FC236}">
+                  <a16:creationId xmlns:a16="http://schemas.microsoft.com/office/drawing/2014/main" id="{D6294229-1D00-4150-A46E-61112BA0C4D1}"/>
+                </a:ext>
+              </a:extLst>
+            </p:cNvPr>
+            <p:cNvCxnSpPr>
+              <a:cxnSpLocks/>
+              <a:endCxn id="19" idx="3"/>
+            </p:cNvCxnSpPr>
+            <p:nvPr/>
+          </p:nvCxnSpPr>
+          <p:spPr>
+            <a:xfrm flipV="1">
+              <a:off x="4600139" y="4183616"/>
+              <a:ext cx="148404" cy="4028"/>
+            </a:xfrm>
+            <a:prstGeom prst="straightConnector1">
+              <a:avLst/>
+            </a:prstGeom>
+            <a:ln>
+              <a:tailEnd type="triangle"/>
+            </a:ln>
+          </p:spPr>
+          <p:style>
+            <a:lnRef idx="1">
+              <a:schemeClr val="accent1"/>
+            </a:lnRef>
+            <a:fillRef idx="0">
+              <a:schemeClr val="accent1"/>
+            </a:fillRef>
+            <a:effectRef idx="0">
+              <a:schemeClr val="accent1"/>
+            </a:effectRef>
+            <a:fontRef idx="minor">
+              <a:schemeClr val="tx1"/>
+            </a:fontRef>
+          </p:style>
+        </p:cxnSp>
+        <p:cxnSp>
+          <p:nvCxnSpPr>
+            <p:cNvPr id="33" name="Straight Arrow Connector 32">
+              <a:extLst>
+                <a:ext uri="{FF2B5EF4-FFF2-40B4-BE49-F238E27FC236}">
+                  <a16:creationId xmlns:a16="http://schemas.microsoft.com/office/drawing/2014/main" id="{E97BC5F0-4729-4C22-B767-74A03B7D2C10}"/>
+                </a:ext>
+              </a:extLst>
+            </p:cNvPr>
+            <p:cNvCxnSpPr>
+              <a:cxnSpLocks/>
+            </p:cNvCxnSpPr>
+            <p:nvPr/>
+          </p:nvCxnSpPr>
+          <p:spPr>
+            <a:xfrm>
+              <a:off x="4875252" y="4187644"/>
+              <a:ext cx="186216" cy="0"/>
+            </a:xfrm>
+            <a:prstGeom prst="straightConnector1">
+              <a:avLst/>
+            </a:prstGeom>
+            <a:ln>
+              <a:tailEnd type="triangle"/>
+            </a:ln>
+          </p:spPr>
+          <p:style>
+            <a:lnRef idx="1">
+              <a:schemeClr val="accent1"/>
+            </a:lnRef>
+            <a:fillRef idx="0">
+              <a:schemeClr val="accent1"/>
+            </a:fillRef>
+            <a:effectRef idx="0">
+              <a:schemeClr val="accent1"/>
+            </a:effectRef>
+            <a:fontRef idx="minor">
+              <a:schemeClr val="tx1"/>
+            </a:fontRef>
+          </p:style>
+        </p:cxnSp>
+        <p:cxnSp>
+          <p:nvCxnSpPr>
+            <p:cNvPr id="36" name="Straight Arrow Connector 35">
+              <a:extLst>
+                <a:ext uri="{FF2B5EF4-FFF2-40B4-BE49-F238E27FC236}">
+                  <a16:creationId xmlns:a16="http://schemas.microsoft.com/office/drawing/2014/main" id="{B5E1306A-4869-41F7-B3F2-4B3D0C37F4DB}"/>
+                </a:ext>
+              </a:extLst>
+            </p:cNvPr>
+            <p:cNvCxnSpPr>
+              <a:cxnSpLocks/>
+            </p:cNvCxnSpPr>
+            <p:nvPr/>
+          </p:nvCxnSpPr>
+          <p:spPr>
+            <a:xfrm>
+              <a:off x="4291877" y="4072309"/>
+              <a:ext cx="151766" cy="0"/>
+            </a:xfrm>
+            <a:prstGeom prst="straightConnector1">
+              <a:avLst/>
+            </a:prstGeom>
+            <a:ln>
+              <a:tailEnd type="triangle"/>
+            </a:ln>
+          </p:spPr>
+          <p:style>
+            <a:lnRef idx="1">
+              <a:schemeClr val="accent1"/>
+            </a:lnRef>
+            <a:fillRef idx="0">
+              <a:schemeClr val="accent1"/>
+            </a:fillRef>
+            <a:effectRef idx="0">
+              <a:schemeClr val="accent1"/>
+            </a:effectRef>
+            <a:fontRef idx="minor">
+              <a:schemeClr val="tx1"/>
+            </a:fontRef>
+          </p:style>
+        </p:cxnSp>
+        <p:cxnSp>
+          <p:nvCxnSpPr>
+            <p:cNvPr id="37" name="Straight Arrow Connector 36">
+              <a:extLst>
+                <a:ext uri="{FF2B5EF4-FFF2-40B4-BE49-F238E27FC236}">
+                  <a16:creationId xmlns:a16="http://schemas.microsoft.com/office/drawing/2014/main" id="{BAC85F60-765E-4A4F-AF16-C0D8FDC5C408}"/>
+                </a:ext>
+              </a:extLst>
+            </p:cNvPr>
+            <p:cNvCxnSpPr>
+              <a:cxnSpLocks/>
+            </p:cNvCxnSpPr>
+            <p:nvPr/>
+          </p:nvCxnSpPr>
+          <p:spPr>
+            <a:xfrm>
+              <a:off x="5191018" y="4080365"/>
+              <a:ext cx="162451" cy="0"/>
+            </a:xfrm>
+            <a:prstGeom prst="straightConnector1">
+              <a:avLst/>
+            </a:prstGeom>
+            <a:ln>
+              <a:tailEnd type="triangle"/>
+            </a:ln>
+          </p:spPr>
+          <p:style>
+            <a:lnRef idx="1">
+              <a:schemeClr val="accent1"/>
+            </a:lnRef>
+            <a:fillRef idx="0">
+              <a:schemeClr val="accent1"/>
+            </a:fillRef>
+            <a:effectRef idx="0">
+              <a:schemeClr val="accent1"/>
+            </a:effectRef>
+            <a:fontRef idx="minor">
+              <a:schemeClr val="tx1"/>
+            </a:fontRef>
+          </p:style>
+        </p:cxnSp>
+        <p:cxnSp>
+          <p:nvCxnSpPr>
+            <p:cNvPr id="40" name="Straight Arrow Connector 39">
+              <a:extLst>
+                <a:ext uri="{FF2B5EF4-FFF2-40B4-BE49-F238E27FC236}">
+                  <a16:creationId xmlns:a16="http://schemas.microsoft.com/office/drawing/2014/main" id="{626A12BA-F52D-40E6-B1C6-70B53C91318F}"/>
+                </a:ext>
+              </a:extLst>
+            </p:cNvPr>
+            <p:cNvCxnSpPr>
+              <a:cxnSpLocks/>
+            </p:cNvCxnSpPr>
+            <p:nvPr/>
+          </p:nvCxnSpPr>
+          <p:spPr>
+            <a:xfrm>
+              <a:off x="5510570" y="3287006"/>
+              <a:ext cx="148679" cy="0"/>
+            </a:xfrm>
+            <a:prstGeom prst="straightConnector1">
+              <a:avLst/>
+            </a:prstGeom>
+            <a:ln>
+              <a:tailEnd type="triangle"/>
+            </a:ln>
+          </p:spPr>
+          <p:style>
+            <a:lnRef idx="1">
+              <a:schemeClr val="accent1"/>
+            </a:lnRef>
+            <a:fillRef idx="0">
+              <a:schemeClr val="accent1"/>
+            </a:fillRef>
+            <a:effectRef idx="0">
+              <a:schemeClr val="accent1"/>
+            </a:effectRef>
+            <a:fontRef idx="minor">
+              <a:schemeClr val="tx1"/>
+            </a:fontRef>
+          </p:style>
+        </p:cxnSp>
+        <p:cxnSp>
+          <p:nvCxnSpPr>
+            <p:cNvPr id="43" name="Straight Arrow Connector 42">
+              <a:extLst>
+                <a:ext uri="{FF2B5EF4-FFF2-40B4-BE49-F238E27FC236}">
+                  <a16:creationId xmlns:a16="http://schemas.microsoft.com/office/drawing/2014/main" id="{79D980F0-63F3-4CCD-A723-3E4F262BBAAC}"/>
+                </a:ext>
+              </a:extLst>
+            </p:cNvPr>
+            <p:cNvCxnSpPr>
+              <a:stCxn id="21" idx="1"/>
+              <a:endCxn id="23" idx="3"/>
+            </p:cNvCxnSpPr>
+            <p:nvPr/>
+          </p:nvCxnSpPr>
+          <p:spPr>
+            <a:xfrm>
+              <a:off x="5821857" y="3093654"/>
+              <a:ext cx="124018" cy="0"/>
+            </a:xfrm>
+            <a:prstGeom prst="straightConnector1">
+              <a:avLst/>
+            </a:prstGeom>
+            <a:ln>
+              <a:tailEnd type="triangle"/>
+            </a:ln>
+          </p:spPr>
+          <p:style>
+            <a:lnRef idx="1">
+              <a:schemeClr val="accent1"/>
+            </a:lnRef>
+            <a:fillRef idx="0">
+              <a:schemeClr val="accent1"/>
+            </a:fillRef>
+            <a:effectRef idx="0">
+              <a:schemeClr val="accent1"/>
+            </a:effectRef>
+            <a:fontRef idx="minor">
+              <a:schemeClr val="tx1"/>
+            </a:fontRef>
+          </p:style>
+        </p:cxnSp>
+        <p:cxnSp>
+          <p:nvCxnSpPr>
+            <p:cNvPr id="48" name="Straight Arrow Connector 47">
+              <a:extLst>
+                <a:ext uri="{FF2B5EF4-FFF2-40B4-BE49-F238E27FC236}">
+                  <a16:creationId xmlns:a16="http://schemas.microsoft.com/office/drawing/2014/main" id="{0279CD53-E64E-4E84-B814-BE4D9457ECCB}"/>
+                </a:ext>
+              </a:extLst>
+            </p:cNvPr>
+            <p:cNvCxnSpPr/>
+            <p:nvPr/>
+          </p:nvCxnSpPr>
+          <p:spPr>
+            <a:xfrm>
+              <a:off x="4250267" y="3386667"/>
+              <a:ext cx="0" cy="0"/>
+            </a:xfrm>
+            <a:prstGeom prst="straightConnector1">
+              <a:avLst/>
+            </a:prstGeom>
+            <a:ln>
+              <a:tailEnd type="triangle"/>
+            </a:ln>
+          </p:spPr>
+          <p:style>
+            <a:lnRef idx="1">
+              <a:schemeClr val="accent1"/>
+            </a:lnRef>
+            <a:fillRef idx="0">
+              <a:schemeClr val="accent1"/>
+            </a:fillRef>
+            <a:effectRef idx="0">
+              <a:schemeClr val="accent1"/>
+            </a:effectRef>
+            <a:fontRef idx="minor">
+              <a:schemeClr val="tx1"/>
+            </a:fontRef>
+          </p:style>
+        </p:cxnSp>
+        <p:cxnSp>
+          <p:nvCxnSpPr>
+            <p:cNvPr id="50" name="Straight Arrow Connector 49">
+              <a:extLst>
+                <a:ext uri="{FF2B5EF4-FFF2-40B4-BE49-F238E27FC236}">
+                  <a16:creationId xmlns:a16="http://schemas.microsoft.com/office/drawing/2014/main" id="{E8B724A7-6ACB-45F8-BD72-A5C0215A067F}"/>
+                </a:ext>
+              </a:extLst>
+            </p:cNvPr>
+            <p:cNvCxnSpPr/>
+            <p:nvPr/>
+          </p:nvCxnSpPr>
+          <p:spPr>
+            <a:xfrm>
+              <a:off x="4619782" y="3911600"/>
+              <a:ext cx="434591" cy="0"/>
+            </a:xfrm>
+            <a:prstGeom prst="straightConnector1">
+              <a:avLst/>
+            </a:prstGeom>
+            <a:ln>
+              <a:solidFill>
+                <a:srgbClr val="00B050"/>
+              </a:solidFill>
+              <a:tailEnd type="triangle"/>
+            </a:ln>
+          </p:spPr>
+          <p:style>
+            <a:lnRef idx="1">
+              <a:schemeClr val="accent1"/>
+            </a:lnRef>
+            <a:fillRef idx="0">
+              <a:schemeClr val="accent1"/>
+            </a:fillRef>
+            <a:effectRef idx="0">
+              <a:schemeClr val="accent1"/>
+            </a:effectRef>
+            <a:fontRef idx="minor">
+              <a:schemeClr val="tx1"/>
+            </a:fontRef>
+          </p:style>
+        </p:cxnSp>
+        <p:cxnSp>
+          <p:nvCxnSpPr>
+            <p:cNvPr id="51" name="Straight Arrow Connector 50">
+              <a:extLst>
+                <a:ext uri="{FF2B5EF4-FFF2-40B4-BE49-F238E27FC236}">
+                  <a16:creationId xmlns:a16="http://schemas.microsoft.com/office/drawing/2014/main" id="{E3ED7D45-EDE5-4A66-953E-BCCEAA438112}"/>
+                </a:ext>
+              </a:extLst>
+            </p:cNvPr>
+            <p:cNvCxnSpPr>
+              <a:cxnSpLocks/>
+            </p:cNvCxnSpPr>
+            <p:nvPr/>
+          </p:nvCxnSpPr>
+          <p:spPr>
+            <a:xfrm>
+              <a:off x="4326467" y="3481945"/>
+              <a:ext cx="1027002" cy="0"/>
+            </a:xfrm>
+            <a:prstGeom prst="straightConnector1">
+              <a:avLst/>
+            </a:prstGeom>
+            <a:ln>
+              <a:solidFill>
+                <a:srgbClr val="00B050"/>
+              </a:solidFill>
+              <a:tailEnd type="triangle"/>
+            </a:ln>
+          </p:spPr>
+          <p:style>
+            <a:lnRef idx="1">
+              <a:schemeClr val="accent1"/>
+            </a:lnRef>
+            <a:fillRef idx="0">
+              <a:schemeClr val="accent1"/>
+            </a:fillRef>
+            <a:effectRef idx="0">
+              <a:schemeClr val="accent1"/>
+            </a:effectRef>
+            <a:fontRef idx="minor">
+              <a:schemeClr val="tx1"/>
+            </a:fontRef>
+          </p:style>
+        </p:cxnSp>
+        <p:cxnSp>
+          <p:nvCxnSpPr>
+            <p:cNvPr id="58" name="Straight Arrow Connector 57">
+              <a:extLst>
+                <a:ext uri="{FF2B5EF4-FFF2-40B4-BE49-F238E27FC236}">
+                  <a16:creationId xmlns:a16="http://schemas.microsoft.com/office/drawing/2014/main" id="{A858664D-41E1-4BB5-80CD-5CD45544D18D}"/>
+                </a:ext>
+              </a:extLst>
+            </p:cNvPr>
+            <p:cNvCxnSpPr>
+              <a:cxnSpLocks/>
+            </p:cNvCxnSpPr>
+            <p:nvPr/>
+          </p:nvCxnSpPr>
+          <p:spPr>
+            <a:xfrm>
+              <a:off x="4027371" y="2643745"/>
+              <a:ext cx="1631878" cy="0"/>
+            </a:xfrm>
+            <a:prstGeom prst="straightConnector1">
+              <a:avLst/>
+            </a:prstGeom>
+            <a:ln>
+              <a:solidFill>
+                <a:srgbClr val="00B050"/>
+              </a:solidFill>
+              <a:tailEnd type="triangle"/>
+            </a:ln>
+          </p:spPr>
+          <p:style>
+            <a:lnRef idx="1">
+              <a:schemeClr val="accent1"/>
+            </a:lnRef>
+            <a:fillRef idx="0">
+              <a:schemeClr val="accent1"/>
+            </a:fillRef>
+            <a:effectRef idx="0">
+              <a:schemeClr val="accent1"/>
+            </a:effectRef>
+            <a:fontRef idx="minor">
+              <a:schemeClr val="tx1"/>
+            </a:fontRef>
+          </p:style>
+        </p:cxnSp>
+      </p:grpSp>
+      <p:sp>
+        <p:nvSpPr>
+          <p:cNvPr id="62" name="Arrow: Right 61">
+            <a:extLst>
+              <a:ext uri="{FF2B5EF4-FFF2-40B4-BE49-F238E27FC236}">
+                <a16:creationId xmlns:a16="http://schemas.microsoft.com/office/drawing/2014/main" id="{47AB7EE8-601B-43EA-80F9-D3EB34F27144}"/>
+              </a:ext>
+            </a:extLst>
+          </p:cNvPr>
+          <p:cNvSpPr/>
+          <p:nvPr/>
+        </p:nvSpPr>
+        <p:spPr>
+          <a:xfrm>
+            <a:off x="3170767" y="1401233"/>
+            <a:ext cx="508000" cy="317500"/>
+          </a:xfrm>
+          <a:prstGeom prst="rightArrow">
+            <a:avLst/>
+          </a:prstGeom>
+          <a:solidFill>
+            <a:schemeClr val="tx1"/>
+          </a:solidFill>
+        </p:spPr>
+        <p:style>
+          <a:lnRef idx="2">
+            <a:schemeClr val="accent1">
+              <a:shade val="50000"/>
+            </a:schemeClr>
+          </a:lnRef>
+          <a:fillRef idx="1">
+            <a:schemeClr val="accent1"/>
+          </a:fillRef>
+          <a:effectRef idx="0">
+            <a:schemeClr val="accent1"/>
+          </a:effectRef>
+          <a:fontRef idx="minor">
+            <a:schemeClr val="lt1"/>
+          </a:fontRef>
+        </p:style>
+        <p:txBody>
+          <a:bodyPr rtlCol="0" anchor="ctr"/>
+          <a:lstStyle/>
+          <a:p>
+            <a:pPr algn="ctr"/>
+            <a:endParaRPr lang="en-DE"/>
+          </a:p>
+        </p:txBody>
+      </p:sp>
+    </p:spTree>
+    <p:extLst>
+      <p:ext uri="{BB962C8B-B14F-4D97-AF65-F5344CB8AC3E}">
+        <p14:creationId xmlns:p14="http://schemas.microsoft.com/office/powerpoint/2010/main" val="3810458660"/>
+      </p:ext>
+    </p:extLst>
+  </p:cSld>
+  <p:clrMapOvr>
+    <a:masterClrMapping/>
+  </p:clrMapOvr>
+</p:sld>
+</file>
+
 <file path=ppt/theme/theme1.xml><?xml version="1.0" encoding="utf-8"?>
 <a:theme xmlns:a="http://schemas.openxmlformats.org/drawingml/2006/main" name="Office Theme">
   <a:themeElements>

</xml_diff>